<commit_message>
Dodanie materiałów prezentowanych na 2. i 3. zajęciach
</commit_message>
<xml_diff>
--- a/Prezentacje/01Cs_PrzygotowanieDanych.pptx
+++ b/Prezentacje/01Cs_PrzygotowanieDanych.pptx
@@ -322,7 +322,7 @@
             <a:fld id="{B61BEF0D-F0BB-DE4B-95CE-6DB70DBA9567}" type="datetimeFigureOut">
               <a:rPr lang="en-US" dirty="0"/>
               <a:pPr/>
-              <a:t>10/21/2016</a:t>
+              <a:t>10/23/2016</a:t>
             </a:fld>
             <a:endParaRPr lang="en-US" dirty="0"/>
           </a:p>
@@ -657,7 +657,7 @@
             <a:fld id="{B61BEF0D-F0BB-DE4B-95CE-6DB70DBA9567}" type="datetimeFigureOut">
               <a:rPr lang="en-US" dirty="0"/>
               <a:pPr/>
-              <a:t>10/21/2016</a:t>
+              <a:t>10/23/2016</a:t>
             </a:fld>
             <a:endParaRPr lang="en-US" dirty="0"/>
           </a:p>
@@ -1055,7 +1055,7 @@
             <a:fld id="{B61BEF0D-F0BB-DE4B-95CE-6DB70DBA9567}" type="datetimeFigureOut">
               <a:rPr lang="en-US" dirty="0"/>
               <a:pPr/>
-              <a:t>10/21/2016</a:t>
+              <a:t>10/23/2016</a:t>
             </a:fld>
             <a:endParaRPr lang="en-US" dirty="0"/>
           </a:p>
@@ -1388,7 +1388,7 @@
             <a:fld id="{B61BEF0D-F0BB-DE4B-95CE-6DB70DBA9567}" type="datetimeFigureOut">
               <a:rPr lang="en-US" dirty="0"/>
               <a:pPr/>
-              <a:t>10/21/2016</a:t>
+              <a:t>10/23/2016</a:t>
             </a:fld>
             <a:endParaRPr lang="en-US" dirty="0"/>
           </a:p>
@@ -1705,7 +1705,7 @@
             <a:fld id="{B61BEF0D-F0BB-DE4B-95CE-6DB70DBA9567}" type="datetimeFigureOut">
               <a:rPr lang="en-US" dirty="0"/>
               <a:pPr/>
-              <a:t>10/21/2016</a:t>
+              <a:t>10/23/2016</a:t>
             </a:fld>
             <a:endParaRPr lang="en-US" dirty="0"/>
           </a:p>
@@ -2098,7 +2098,7 @@
             <a:fld id="{B61BEF0D-F0BB-DE4B-95CE-6DB70DBA9567}" type="datetimeFigureOut">
               <a:rPr lang="en-US" dirty="0"/>
               <a:pPr/>
-              <a:t>10/21/2016</a:t>
+              <a:t>10/23/2016</a:t>
             </a:fld>
             <a:endParaRPr lang="en-US" dirty="0"/>
           </a:p>
@@ -2352,7 +2352,7 @@
             <a:fld id="{B61BEF0D-F0BB-DE4B-95CE-6DB70DBA9567}" type="datetimeFigureOut">
               <a:rPr lang="en-US" dirty="0"/>
               <a:pPr/>
-              <a:t>10/21/2016</a:t>
+              <a:t>10/23/2016</a:t>
             </a:fld>
             <a:endParaRPr lang="en-US" dirty="0"/>
           </a:p>
@@ -2611,7 +2611,7 @@
             <a:fld id="{B61BEF0D-F0BB-DE4B-95CE-6DB70DBA9567}" type="datetimeFigureOut">
               <a:rPr lang="en-US" dirty="0"/>
               <a:pPr/>
-              <a:t>10/21/2016</a:t>
+              <a:t>10/23/2016</a:t>
             </a:fld>
             <a:endParaRPr lang="en-US" dirty="0"/>
           </a:p>
@@ -2870,7 +2870,7 @@
             <a:fld id="{B61BEF0D-F0BB-DE4B-95CE-6DB70DBA9567}" type="datetimeFigureOut">
               <a:rPr lang="en-US" dirty="0"/>
               <a:pPr/>
-              <a:t>10/21/2016</a:t>
+              <a:t>10/23/2016</a:t>
             </a:fld>
             <a:endParaRPr lang="en-US" dirty="0"/>
           </a:p>
@@ -3196,7 +3196,7 @@
             <a:fld id="{B61BEF0D-F0BB-DE4B-95CE-6DB70DBA9567}" type="datetimeFigureOut">
               <a:rPr lang="en-US" dirty="0"/>
               <a:pPr/>
-              <a:t>10/21/2016</a:t>
+              <a:t>10/23/2016</a:t>
             </a:fld>
             <a:endParaRPr lang="en-US" dirty="0"/>
           </a:p>
@@ -3516,7 +3516,7 @@
             <a:fld id="{B61BEF0D-F0BB-DE4B-95CE-6DB70DBA9567}" type="datetimeFigureOut">
               <a:rPr lang="en-US" dirty="0"/>
               <a:pPr/>
-              <a:t>10/21/2016</a:t>
+              <a:t>10/23/2016</a:t>
             </a:fld>
             <a:endParaRPr lang="en-US" dirty="0"/>
           </a:p>
@@ -3970,7 +3970,7 @@
             <a:fld id="{B61BEF0D-F0BB-DE4B-95CE-6DB70DBA9567}" type="datetimeFigureOut">
               <a:rPr lang="en-US" dirty="0"/>
               <a:pPr/>
-              <a:t>10/21/2016</a:t>
+              <a:t>10/23/2016</a:t>
             </a:fld>
             <a:endParaRPr lang="en-US" dirty="0"/>
           </a:p>
@@ -4172,7 +4172,7 @@
             <a:fld id="{B61BEF0D-F0BB-DE4B-95CE-6DB70DBA9567}" type="datetimeFigureOut">
               <a:rPr lang="en-US" dirty="0"/>
               <a:pPr/>
-              <a:t>10/21/2016</a:t>
+              <a:t>10/23/2016</a:t>
             </a:fld>
             <a:endParaRPr lang="en-US" dirty="0"/>
           </a:p>
@@ -4346,7 +4346,7 @@
             <a:fld id="{B61BEF0D-F0BB-DE4B-95CE-6DB70DBA9567}" type="datetimeFigureOut">
               <a:rPr lang="en-US" dirty="0"/>
               <a:pPr/>
-              <a:t>10/21/2016</a:t>
+              <a:t>10/23/2016</a:t>
             </a:fld>
             <a:endParaRPr lang="en-US" dirty="0"/>
           </a:p>
@@ -4676,7 +4676,7 @@
             <a:fld id="{B61BEF0D-F0BB-DE4B-95CE-6DB70DBA9567}" type="datetimeFigureOut">
               <a:rPr lang="en-US" dirty="0"/>
               <a:pPr/>
-              <a:t>10/21/2016</a:t>
+              <a:t>10/23/2016</a:t>
             </a:fld>
             <a:endParaRPr lang="en-US" dirty="0"/>
           </a:p>
@@ -5018,7 +5018,7 @@
             <a:fld id="{B61BEF0D-F0BB-DE4B-95CE-6DB70DBA9567}" type="datetimeFigureOut">
               <a:rPr lang="en-US" dirty="0"/>
               <a:pPr/>
-              <a:t>10/21/2016</a:t>
+              <a:t>10/23/2016</a:t>
             </a:fld>
             <a:endParaRPr lang="en-US" dirty="0"/>
           </a:p>
@@ -7132,7 +7132,7 @@
             <a:fld id="{B61BEF0D-F0BB-DE4B-95CE-6DB70DBA9567}" type="datetimeFigureOut">
               <a:rPr lang="en-US" dirty="0"/>
               <a:pPr/>
-              <a:t>10/21/2016</a:t>
+              <a:t>10/23/2016</a:t>
             </a:fld>
             <a:endParaRPr lang="en-US" dirty="0"/>
           </a:p>
@@ -7773,13 +7773,8 @@
             <a:pPr lvl="1"/>
             <a:r>
               <a:rPr lang="pl-PL" dirty="0"/>
-              <a:t>2. Zakresem liczb jakie mogą przechowywać (</a:t>
-            </a:r>
-            <a:r>
-              <a:rPr lang="pl-PL" dirty="0"/>
-              <a:t>w przypadku typów liczbowych)</a:t>
-            </a:r>
-            <a:endParaRPr lang="pl-PL" dirty="0"/>
+              <a:t>2. Zakresem liczb jakie mogą przechowywać (w przypadku typów liczbowych)</a:t>
+            </a:r>
           </a:p>
           <a:p>
             <a:pPr lvl="1"/>
@@ -9149,7 +9144,6 @@
               <a:rPr lang="pl-PL" dirty="0"/>
               <a:t>Przyswójcie dobrze zaprezentowany materiał, będzie nam niezbędny na kolejnych zajęćach</a:t>
             </a:r>
-            <a:endParaRPr lang="pl-PL" dirty="0"/>
           </a:p>
           <a:p>
             <a:r>

</xml_diff>